<commit_message>
NSB-11 Support SD/eMMC boot device #3 Done
Signed-off-by: Jay Heng <jie.heng@nxp.com>
</commit_message>
<xml_diff>
--- a/img/i.MX RT image layout.pptx
+++ b/img/i.MX RT image layout.pptx
@@ -144,7 +144,7 @@
   <p:extLst>
     <p:ext uri="{EFAFB233-063F-42B5-8137-9DF3F51BA10A}">
       <p15:sldGuideLst xmlns:p15="http://schemas.microsoft.com/office/powerpoint/2012/main">
-        <p15:guide id="1" orient="horz" pos="2200">
+        <p15:guide id="1" orient="horz" pos="2176">
           <p15:clr>
             <a:srgbClr val="A4A3A4"/>
           </p15:clr>
@@ -158,7 +158,7 @@
     </p:ext>
     <p:ext uri="{2D200454-40CA-4A62-9FC3-DE9A4176ACB9}">
       <p15:notesGuideLst xmlns:p15="http://schemas.microsoft.com/office/powerpoint/2012/main">
-        <p15:guide id="1" orient="horz" pos="3081">
+        <p15:guide id="1" orient="horz" pos="3047">
           <p15:clr>
             <a:srgbClr val="A4A3A4"/>
           </p15:clr>
@@ -248,7 +248,7 @@
                   </a:schemeClr>
                 </a:solidFill>
               </a:rPr>
-              <a:t>12/20/2018 10:37:11 PM</a:t>
+              <a:t>5/6/2019 7:57:20 PM</a:t>
             </a:fld>
             <a:endParaRPr lang="en-US" sz="900" dirty="0">
               <a:solidFill>
@@ -1438,7 +1438,7 @@
                   </a:schemeClr>
                 </a:solidFill>
               </a:rPr>
-              <a:t>12/20/2018 10:37:10 PM</a:t>
+              <a:t>5/6/2019 7:57:20 PM</a:t>
             </a:fld>
             <a:endParaRPr lang="en-US" sz="900" dirty="0">
               <a:solidFill>
@@ -29310,7 +29310,7 @@
           <a:p>
             <a:fld id="{3BDFDD5F-E85B-4DA3-A4F9-9CF3C7409943}" type="datetime4">
               <a:rPr lang="en-US" smtClean="0"/>
-              <a:t>December 20, 2018</a:t>
+              <a:t>May 6, 2019</a:t>
             </a:fld>
             <a:endParaRPr lang="en-US" dirty="0"/>
           </a:p>
@@ -40957,7 +40957,7 @@
         </p:nvGrpSpPr>
         <p:grpSpPr>
           <a:xfrm>
-            <a:off x="2148673" y="934059"/>
+            <a:off x="4230838" y="578459"/>
             <a:ext cx="2877185" cy="4989882"/>
             <a:chOff x="-1039352" y="-84240"/>
             <a:chExt cx="2877185" cy="4584065"/>
@@ -41048,7 +41048,7 @@
         </p:nvSpPr>
         <p:spPr>
           <a:xfrm>
-            <a:off x="2159000" y="2870200"/>
+            <a:off x="4241165" y="2514600"/>
             <a:ext cx="2870835" cy="306705"/>
           </a:xfrm>
           <a:prstGeom prst="rect">
@@ -41088,7 +41088,7 @@
         </p:nvSpPr>
         <p:spPr>
           <a:xfrm>
-            <a:off x="2148840" y="3176905"/>
+            <a:off x="4231005" y="2821305"/>
             <a:ext cx="2870835" cy="306705"/>
           </a:xfrm>
           <a:prstGeom prst="rect">
@@ -41128,7 +41128,7 @@
         </p:nvSpPr>
         <p:spPr>
           <a:xfrm>
-            <a:off x="2159000" y="4023995"/>
+            <a:off x="4241165" y="3668395"/>
             <a:ext cx="2870835" cy="738664"/>
           </a:xfrm>
           <a:prstGeom prst="rect">
@@ -41180,7 +41180,7 @@
         </p:nvSpPr>
         <p:spPr>
           <a:xfrm>
-            <a:off x="2155190" y="4876316"/>
+            <a:off x="4237355" y="4520716"/>
             <a:ext cx="2870835" cy="521970"/>
           </a:xfrm>
           <a:prstGeom prst="rect">
@@ -41230,7 +41230,7 @@
         </p:nvSpPr>
         <p:spPr>
           <a:xfrm>
-            <a:off x="2155190" y="5506505"/>
+            <a:off x="4237355" y="5150905"/>
             <a:ext cx="2870835" cy="306705"/>
           </a:xfrm>
           <a:prstGeom prst="rect">
@@ -41264,19 +41264,13 @@
       </p:sp>
       <p:sp>
         <p:nvSpPr>
-          <p:cNvPr id="13" name="TextBox 63">
-            <a:extLst>
-              <a:ext uri="{FF2B5EF4-FFF2-40B4-BE49-F238E27FC236}">
-                <a16:creationId xmlns:a16="http://schemas.microsoft.com/office/drawing/2014/main" id="{5A7B5E0E-50B5-48F4-8729-8EF828C8FF20}"/>
-              </a:ext>
-            </a:extLst>
-          </p:cNvPr>
+          <p:cNvPr id="13" name="TextBox 63"/>
           <p:cNvSpPr txBox="1"/>
           <p:nvPr/>
         </p:nvSpPr>
         <p:spPr>
           <a:xfrm>
-            <a:off x="2155190" y="3534727"/>
+            <a:off x="4237355" y="3179127"/>
             <a:ext cx="2870835" cy="276999"/>
           </a:xfrm>
           <a:prstGeom prst="rect">
@@ -41310,19 +41304,13 @@
       </p:sp>
       <p:sp>
         <p:nvSpPr>
-          <p:cNvPr id="14" name="TextBox 63">
-            <a:extLst>
-              <a:ext uri="{FF2B5EF4-FFF2-40B4-BE49-F238E27FC236}">
-                <a16:creationId xmlns:a16="http://schemas.microsoft.com/office/drawing/2014/main" id="{F125CC63-7FD9-4822-A7F1-B97429B09BD6}"/>
-              </a:ext>
-            </a:extLst>
-          </p:cNvPr>
+          <p:cNvPr id="14" name="TextBox 63"/>
           <p:cNvSpPr txBox="1"/>
           <p:nvPr/>
         </p:nvSpPr>
         <p:spPr>
           <a:xfrm>
-            <a:off x="2162810" y="934059"/>
+            <a:off x="4244975" y="578459"/>
             <a:ext cx="2863215" cy="276999"/>
           </a:xfrm>
           <a:prstGeom prst="rect">
@@ -41353,19 +41341,13 @@
       </p:sp>
       <p:sp>
         <p:nvSpPr>
-          <p:cNvPr id="15" name="TextBox 63">
-            <a:extLst>
-              <a:ext uri="{FF2B5EF4-FFF2-40B4-BE49-F238E27FC236}">
-                <a16:creationId xmlns:a16="http://schemas.microsoft.com/office/drawing/2014/main" id="{59E20EE5-C49F-44F3-9B74-F04D551C69EF}"/>
-              </a:ext>
-            </a:extLst>
-          </p:cNvPr>
+          <p:cNvPr id="15" name="TextBox 63"/>
           <p:cNvSpPr txBox="1"/>
           <p:nvPr/>
         </p:nvSpPr>
         <p:spPr>
           <a:xfrm>
-            <a:off x="2162810" y="1291881"/>
+            <a:off x="4244975" y="936281"/>
             <a:ext cx="2863215" cy="276999"/>
           </a:xfrm>
           <a:prstGeom prst="rect">
@@ -41402,19 +41384,13 @@
       </p:sp>
       <p:grpSp>
         <p:nvGrpSpPr>
-          <p:cNvPr id="17" name="Group 72">
-            <a:extLst>
-              <a:ext uri="{FF2B5EF4-FFF2-40B4-BE49-F238E27FC236}">
-                <a16:creationId xmlns:a16="http://schemas.microsoft.com/office/drawing/2014/main" id="{6929A017-E5BF-4867-B65F-C332D9CA6B40}"/>
-              </a:ext>
-            </a:extLst>
-          </p:cNvPr>
+          <p:cNvPr id="17" name="Group 72"/>
           <p:cNvGrpSpPr/>
           <p:nvPr/>
         </p:nvGrpSpPr>
         <p:grpSpPr>
           <a:xfrm>
-            <a:off x="6577211" y="934060"/>
+            <a:off x="655836" y="578460"/>
             <a:ext cx="2877185" cy="4989882"/>
             <a:chOff x="-1039352" y="-84240"/>
             <a:chExt cx="2877185" cy="4584065"/>
@@ -41422,13 +41398,7 @@
         </p:grpSpPr>
         <p:cxnSp>
           <p:nvCxnSpPr>
-            <p:cNvPr id="18" name="Straight Connector 17">
-              <a:extLst>
-                <a:ext uri="{FF2B5EF4-FFF2-40B4-BE49-F238E27FC236}">
-                  <a16:creationId xmlns:a16="http://schemas.microsoft.com/office/drawing/2014/main" id="{0D6D2D8B-05FF-4C35-989D-28CCC42D0842}"/>
-                </a:ext>
-              </a:extLst>
-            </p:cNvPr>
+            <p:cNvPr id="18" name="Straight Connector 17"/>
             <p:cNvCxnSpPr/>
             <p:nvPr/>
           </p:nvCxnSpPr>
@@ -41458,13 +41428,7 @@
         </p:cxnSp>
         <p:sp>
           <p:nvSpPr>
-            <p:cNvPr id="19" name="Rectangle 18">
-              <a:extLst>
-                <a:ext uri="{FF2B5EF4-FFF2-40B4-BE49-F238E27FC236}">
-                  <a16:creationId xmlns:a16="http://schemas.microsoft.com/office/drawing/2014/main" id="{1C4610B6-211E-4C6C-BB2B-5D82B71E093A}"/>
-                </a:ext>
-              </a:extLst>
-            </p:cNvPr>
+            <p:cNvPr id="19" name="Rectangle 18"/>
             <p:cNvSpPr/>
             <p:nvPr/>
           </p:nvSpPr>
@@ -41511,19 +41475,13 @@
       </p:grpSp>
       <p:sp>
         <p:nvSpPr>
-          <p:cNvPr id="20" name="TextBox 63">
-            <a:extLst>
-              <a:ext uri="{FF2B5EF4-FFF2-40B4-BE49-F238E27FC236}">
-                <a16:creationId xmlns:a16="http://schemas.microsoft.com/office/drawing/2014/main" id="{00CA6108-9B5C-47AE-8509-C6D55EE10294}"/>
-              </a:ext>
-            </a:extLst>
-          </p:cNvPr>
+          <p:cNvPr id="20" name="TextBox 63"/>
           <p:cNvSpPr txBox="1"/>
           <p:nvPr/>
         </p:nvSpPr>
         <p:spPr>
           <a:xfrm>
-            <a:off x="6589911" y="1352150"/>
+            <a:off x="668536" y="996550"/>
             <a:ext cx="2870835" cy="245110"/>
           </a:xfrm>
           <a:prstGeom prst="rect">
@@ -41554,19 +41512,13 @@
       </p:sp>
       <p:sp>
         <p:nvSpPr>
-          <p:cNvPr id="21" name="TextBox 63">
-            <a:extLst>
-              <a:ext uri="{FF2B5EF4-FFF2-40B4-BE49-F238E27FC236}">
-                <a16:creationId xmlns:a16="http://schemas.microsoft.com/office/drawing/2014/main" id="{59C64752-7C4F-4656-8192-549779E01E2A}"/>
-              </a:ext>
-            </a:extLst>
-          </p:cNvPr>
+          <p:cNvPr id="21" name="TextBox 63"/>
           <p:cNvSpPr txBox="1"/>
           <p:nvPr/>
         </p:nvSpPr>
         <p:spPr>
           <a:xfrm>
-            <a:off x="6597531" y="934059"/>
+            <a:off x="676156" y="578459"/>
             <a:ext cx="2863215" cy="276999"/>
           </a:xfrm>
           <a:prstGeom prst="rect">
@@ -41597,19 +41549,13 @@
       </p:sp>
       <p:sp>
         <p:nvSpPr>
-          <p:cNvPr id="22" name="TextBox 63">
-            <a:extLst>
-              <a:ext uri="{FF2B5EF4-FFF2-40B4-BE49-F238E27FC236}">
-                <a16:creationId xmlns:a16="http://schemas.microsoft.com/office/drawing/2014/main" id="{425B4957-B5A6-4512-A48E-6D70102F27BB}"/>
-              </a:ext>
-            </a:extLst>
-          </p:cNvPr>
+          <p:cNvPr id="22" name="TextBox 63"/>
           <p:cNvSpPr txBox="1"/>
           <p:nvPr/>
         </p:nvSpPr>
         <p:spPr>
           <a:xfrm>
-            <a:off x="6593721" y="1677905"/>
+            <a:off x="672346" y="1322305"/>
             <a:ext cx="2870835" cy="245110"/>
           </a:xfrm>
           <a:prstGeom prst="rect">
@@ -41640,19 +41586,13 @@
       </p:sp>
       <p:sp>
         <p:nvSpPr>
-          <p:cNvPr id="23" name="TextBox 63">
-            <a:extLst>
-              <a:ext uri="{FF2B5EF4-FFF2-40B4-BE49-F238E27FC236}">
-                <a16:creationId xmlns:a16="http://schemas.microsoft.com/office/drawing/2014/main" id="{A9488513-3B14-48AD-9C05-8385E002B688}"/>
-              </a:ext>
-            </a:extLst>
-          </p:cNvPr>
+          <p:cNvPr id="23" name="TextBox 63"/>
           <p:cNvSpPr txBox="1"/>
           <p:nvPr/>
         </p:nvSpPr>
         <p:spPr>
           <a:xfrm>
-            <a:off x="6593721" y="2101450"/>
+            <a:off x="672346" y="1745850"/>
             <a:ext cx="2870835" cy="306705"/>
           </a:xfrm>
           <a:prstGeom prst="rect">
@@ -41686,19 +41626,13 @@
       </p:sp>
       <p:sp>
         <p:nvSpPr>
-          <p:cNvPr id="24" name="TextBox 63">
-            <a:extLst>
-              <a:ext uri="{FF2B5EF4-FFF2-40B4-BE49-F238E27FC236}">
-                <a16:creationId xmlns:a16="http://schemas.microsoft.com/office/drawing/2014/main" id="{A7719C2B-02A1-43BC-93EC-E5DEFF49C520}"/>
-              </a:ext>
-            </a:extLst>
-          </p:cNvPr>
+          <p:cNvPr id="24" name="TextBox 63"/>
           <p:cNvSpPr txBox="1"/>
           <p:nvPr/>
         </p:nvSpPr>
         <p:spPr>
           <a:xfrm>
-            <a:off x="6583561" y="2408155"/>
+            <a:off x="662186" y="2052555"/>
             <a:ext cx="2870835" cy="306705"/>
           </a:xfrm>
           <a:prstGeom prst="rect">
@@ -41732,19 +41666,13 @@
       </p:sp>
       <p:sp>
         <p:nvSpPr>
-          <p:cNvPr id="25" name="TextBox 63">
-            <a:extLst>
-              <a:ext uri="{FF2B5EF4-FFF2-40B4-BE49-F238E27FC236}">
-                <a16:creationId xmlns:a16="http://schemas.microsoft.com/office/drawing/2014/main" id="{172641C9-FE19-44EE-86F5-5D50E2F1B7BD}"/>
-              </a:ext>
-            </a:extLst>
-          </p:cNvPr>
+          <p:cNvPr id="25" name="TextBox 63"/>
           <p:cNvSpPr txBox="1"/>
           <p:nvPr/>
         </p:nvSpPr>
         <p:spPr>
           <a:xfrm>
-            <a:off x="6593721" y="3255245"/>
+            <a:off x="672346" y="2899645"/>
             <a:ext cx="2870835" cy="738664"/>
           </a:xfrm>
           <a:prstGeom prst="rect">
@@ -41790,19 +41718,13 @@
       </p:sp>
       <p:sp>
         <p:nvSpPr>
-          <p:cNvPr id="26" name="TextBox 63">
-            <a:extLst>
-              <a:ext uri="{FF2B5EF4-FFF2-40B4-BE49-F238E27FC236}">
-                <a16:creationId xmlns:a16="http://schemas.microsoft.com/office/drawing/2014/main" id="{A61E60B5-41BB-4967-82AD-A464DEF7FCBA}"/>
-              </a:ext>
-            </a:extLst>
-          </p:cNvPr>
+          <p:cNvPr id="26" name="TextBox 63"/>
           <p:cNvSpPr txBox="1"/>
           <p:nvPr/>
         </p:nvSpPr>
         <p:spPr>
           <a:xfrm>
-            <a:off x="6589911" y="4107566"/>
+            <a:off x="668536" y="3751966"/>
             <a:ext cx="2870835" cy="521970"/>
           </a:xfrm>
           <a:prstGeom prst="rect">
@@ -41846,19 +41768,13 @@
       </p:sp>
       <p:sp>
         <p:nvSpPr>
-          <p:cNvPr id="27" name="TextBox 63">
-            <a:extLst>
-              <a:ext uri="{FF2B5EF4-FFF2-40B4-BE49-F238E27FC236}">
-                <a16:creationId xmlns:a16="http://schemas.microsoft.com/office/drawing/2014/main" id="{1A6420A2-416B-4BBE-88F7-360A30FAD670}"/>
-              </a:ext>
-            </a:extLst>
-          </p:cNvPr>
+          <p:cNvPr id="27" name="TextBox 63"/>
           <p:cNvSpPr txBox="1"/>
           <p:nvPr/>
         </p:nvSpPr>
         <p:spPr>
           <a:xfrm>
-            <a:off x="6589911" y="4737755"/>
+            <a:off x="668536" y="4382155"/>
             <a:ext cx="2870835" cy="306705"/>
           </a:xfrm>
           <a:prstGeom prst="rect">
@@ -41892,19 +41808,13 @@
       </p:sp>
       <p:sp>
         <p:nvSpPr>
-          <p:cNvPr id="28" name="TextBox 63">
-            <a:extLst>
-              <a:ext uri="{FF2B5EF4-FFF2-40B4-BE49-F238E27FC236}">
-                <a16:creationId xmlns:a16="http://schemas.microsoft.com/office/drawing/2014/main" id="{2070844C-26D5-47E5-B056-E398CE9857FE}"/>
-              </a:ext>
-            </a:extLst>
-          </p:cNvPr>
+          <p:cNvPr id="28" name="TextBox 63"/>
           <p:cNvSpPr txBox="1"/>
           <p:nvPr/>
         </p:nvSpPr>
         <p:spPr>
           <a:xfrm>
-            <a:off x="6589911" y="2765977"/>
+            <a:off x="668536" y="2410377"/>
             <a:ext cx="2870835" cy="276999"/>
           </a:xfrm>
           <a:prstGeom prst="rect">
@@ -41933,6 +41843,413 @@
               <a:t>Device Configuration Data (DCD)</a:t>
             </a:r>
             <a:endParaRPr lang="en-US" sz="1200" dirty="0"/>
+          </a:p>
+        </p:txBody>
+      </p:sp>
+      <p:grpSp>
+        <p:nvGrpSpPr>
+          <p:cNvPr id="2" name="Group 72"/>
+          <p:cNvGrpSpPr/>
+          <p:nvPr/>
+        </p:nvGrpSpPr>
+        <p:grpSpPr>
+          <a:xfrm>
+            <a:off x="7942461" y="578460"/>
+            <a:ext cx="2877185" cy="4989882"/>
+            <a:chOff x="-1039352" y="-84240"/>
+            <a:chExt cx="2877185" cy="4584065"/>
+          </a:xfrm>
+        </p:grpSpPr>
+        <p:cxnSp>
+          <p:nvCxnSpPr>
+            <p:cNvPr id="4" name="Straight Connector 17"/>
+            <p:cNvCxnSpPr/>
+            <p:nvPr/>
+          </p:nvCxnSpPr>
+          <p:spPr>
+            <a:xfrm rot="5400000" flipH="1" flipV="1">
+              <a:off x="-1036714" y="2136842"/>
+              <a:ext cx="0" cy="0"/>
+            </a:xfrm>
+            <a:prstGeom prst="line">
+              <a:avLst/>
+            </a:prstGeom>
+          </p:spPr>
+          <p:style>
+            <a:lnRef idx="1">
+              <a:schemeClr val="accent1"/>
+            </a:lnRef>
+            <a:fillRef idx="0">
+              <a:schemeClr val="accent1"/>
+            </a:fillRef>
+            <a:effectRef idx="0">
+              <a:schemeClr val="accent1"/>
+            </a:effectRef>
+            <a:fontRef idx="minor">
+              <a:schemeClr val="tx1"/>
+            </a:fontRef>
+          </p:style>
+        </p:cxnSp>
+        <p:sp>
+          <p:nvSpPr>
+            <p:cNvPr id="5" name="Rectangle 18"/>
+            <p:cNvSpPr/>
+            <p:nvPr/>
+          </p:nvSpPr>
+          <p:spPr>
+            <a:xfrm>
+              <a:off x="-1039352" y="-84240"/>
+              <a:ext cx="2877185" cy="4584065"/>
+            </a:xfrm>
+            <a:prstGeom prst="rect">
+              <a:avLst/>
+            </a:prstGeom>
+            <a:noFill/>
+            <a:ln>
+              <a:solidFill>
+                <a:schemeClr val="tx1"/>
+              </a:solidFill>
+            </a:ln>
+          </p:spPr>
+          <p:style>
+            <a:lnRef idx="2">
+              <a:schemeClr val="accent1">
+                <a:shade val="50000"/>
+              </a:schemeClr>
+            </a:lnRef>
+            <a:fillRef idx="1">
+              <a:schemeClr val="accent1"/>
+            </a:fillRef>
+            <a:effectRef idx="0">
+              <a:schemeClr val="accent1"/>
+            </a:effectRef>
+            <a:fontRef idx="minor">
+              <a:schemeClr val="lt1"/>
+            </a:fontRef>
+          </p:style>
+          <p:txBody>
+            <a:bodyPr rtlCol="0" anchor="ctr"/>
+            <a:lstStyle/>
+            <a:p>
+              <a:pPr algn="ctr"/>
+              <a:endParaRPr lang="en-US" dirty="0"/>
+            </a:p>
+          </p:txBody>
+        </p:sp>
+      </p:grpSp>
+      <p:sp>
+        <p:nvSpPr>
+          <p:cNvPr id="9" name="TextBox 63"/>
+          <p:cNvSpPr txBox="1"/>
+          <p:nvPr/>
+        </p:nvSpPr>
+        <p:spPr>
+          <a:xfrm>
+            <a:off x="7958971" y="1745850"/>
+            <a:ext cx="2870835" cy="306705"/>
+          </a:xfrm>
+          <a:prstGeom prst="rect">
+            <a:avLst/>
+          </a:prstGeom>
+          <a:solidFill>
+            <a:srgbClr val="FF0000"/>
+          </a:solidFill>
+          <a:ln w="19050">
+            <a:solidFill>
+              <a:schemeClr val="tx1"/>
+            </a:solidFill>
+          </a:ln>
+        </p:spPr>
+        <p:txBody>
+          <a:bodyPr wrap="square" rtlCol="0">
+            <a:spAutoFit/>
+          </a:bodyPr>
+          <a:lstStyle/>
+          <a:p>
+            <a:pPr algn="ctr"/>
+            <a:r>
+              <a:rPr lang="en-US" sz="1400" dirty="0">
+                <a:sym typeface="+mn-ea"/>
+              </a:rPr>
+              <a:t>Image Vector Table (IVT)</a:t>
+            </a:r>
+            <a:endParaRPr lang="en-US" sz="1400" dirty="0"/>
+          </a:p>
+        </p:txBody>
+      </p:sp>
+      <p:sp>
+        <p:nvSpPr>
+          <p:cNvPr id="10" name="TextBox 63"/>
+          <p:cNvSpPr txBox="1"/>
+          <p:nvPr/>
+        </p:nvSpPr>
+        <p:spPr>
+          <a:xfrm>
+            <a:off x="7948811" y="2052555"/>
+            <a:ext cx="2870835" cy="306705"/>
+          </a:xfrm>
+          <a:prstGeom prst="rect">
+            <a:avLst/>
+          </a:prstGeom>
+          <a:solidFill>
+            <a:srgbClr val="00B050"/>
+          </a:solidFill>
+          <a:ln w="19050">
+            <a:solidFill>
+              <a:schemeClr val="tx1"/>
+            </a:solidFill>
+          </a:ln>
+        </p:spPr>
+        <p:txBody>
+          <a:bodyPr wrap="square" rtlCol="0">
+            <a:spAutoFit/>
+          </a:bodyPr>
+          <a:lstStyle/>
+          <a:p>
+            <a:pPr algn="ctr"/>
+            <a:r>
+              <a:rPr lang="en-US" sz="1400" dirty="0">
+                <a:sym typeface="+mn-ea"/>
+              </a:rPr>
+              <a:t>Boot Data</a:t>
+            </a:r>
+            <a:endParaRPr lang="en-US" sz="1400" dirty="0"/>
+          </a:p>
+        </p:txBody>
+      </p:sp>
+      <p:sp>
+        <p:nvSpPr>
+          <p:cNvPr id="11" name="TextBox 63"/>
+          <p:cNvSpPr txBox="1"/>
+          <p:nvPr/>
+        </p:nvSpPr>
+        <p:spPr>
+          <a:xfrm>
+            <a:off x="7958971" y="2899645"/>
+            <a:ext cx="2870835" cy="738664"/>
+          </a:xfrm>
+          <a:prstGeom prst="rect">
+            <a:avLst/>
+          </a:prstGeom>
+          <a:solidFill>
+            <a:srgbClr val="0070C0"/>
+          </a:solidFill>
+          <a:ln w="19050">
+            <a:solidFill>
+              <a:schemeClr val="tx1"/>
+            </a:solidFill>
+          </a:ln>
+        </p:spPr>
+        <p:txBody>
+          <a:bodyPr wrap="square" rtlCol="0">
+            <a:spAutoFit/>
+          </a:bodyPr>
+          <a:lstStyle/>
+          <a:p>
+            <a:pPr algn="ctr"/>
+            <a:r>
+              <a:rPr lang="en-US" sz="1400" dirty="0">
+                <a:sym typeface="+mn-ea"/>
+              </a:rPr>
+              <a:t>Application Image</a:t>
+            </a:r>
+          </a:p>
+          <a:p>
+            <a:pPr algn="ctr"/>
+            <a:endParaRPr lang="en-US" sz="1400" dirty="0">
+              <a:sym typeface="+mn-ea"/>
+            </a:endParaRPr>
+          </a:p>
+          <a:p>
+            <a:pPr algn="ctr"/>
+            <a:r>
+              <a:rPr lang="en-US" sz="1400" dirty="0"/>
+              <a:t>Plaintext</a:t>
+            </a:r>
+          </a:p>
+        </p:txBody>
+      </p:sp>
+      <p:sp>
+        <p:nvSpPr>
+          <p:cNvPr id="12" name="TextBox 63"/>
+          <p:cNvSpPr txBox="1"/>
+          <p:nvPr/>
+        </p:nvSpPr>
+        <p:spPr>
+          <a:xfrm>
+            <a:off x="7955161" y="3751966"/>
+            <a:ext cx="2870835" cy="521970"/>
+          </a:xfrm>
+          <a:prstGeom prst="rect">
+            <a:avLst/>
+          </a:prstGeom>
+          <a:solidFill>
+            <a:srgbClr val="FFC0CB"/>
+          </a:solidFill>
+          <a:ln w="19050">
+            <a:solidFill>
+              <a:schemeClr val="tx1"/>
+            </a:solidFill>
+          </a:ln>
+        </p:spPr>
+        <p:txBody>
+          <a:bodyPr wrap="square" rtlCol="0">
+            <a:spAutoFit/>
+          </a:bodyPr>
+          <a:lstStyle/>
+          <a:p>
+            <a:pPr algn="ctr"/>
+            <a:r>
+              <a:rPr lang="en-US" sz="1400" dirty="0">
+                <a:sym typeface="+mn-ea"/>
+              </a:rPr>
+              <a:t>HAB Data</a:t>
+            </a:r>
+            <a:endParaRPr lang="en-US" sz="1400" dirty="0"/>
+          </a:p>
+          <a:p>
+            <a:pPr algn="ctr"/>
+            <a:r>
+              <a:rPr lang="en-US" sz="1400" dirty="0">
+                <a:sym typeface="+mn-ea"/>
+              </a:rPr>
+              <a:t>(CSF, Certs, Signatures)</a:t>
+            </a:r>
+            <a:endParaRPr lang="en-US" sz="1400" dirty="0"/>
+          </a:p>
+        </p:txBody>
+      </p:sp>
+      <p:sp>
+        <p:nvSpPr>
+          <p:cNvPr id="29" name="TextBox 63"/>
+          <p:cNvSpPr txBox="1"/>
+          <p:nvPr/>
+        </p:nvSpPr>
+        <p:spPr>
+          <a:xfrm>
+            <a:off x="7955161" y="4382155"/>
+            <a:ext cx="2870835" cy="306705"/>
+          </a:xfrm>
+          <a:prstGeom prst="rect">
+            <a:avLst/>
+          </a:prstGeom>
+          <a:solidFill>
+            <a:srgbClr val="FF7F00"/>
+          </a:solidFill>
+          <a:ln w="19050">
+            <a:solidFill>
+              <a:schemeClr val="tx1"/>
+            </a:solidFill>
+          </a:ln>
+        </p:spPr>
+        <p:txBody>
+          <a:bodyPr wrap="square" rtlCol="0">
+            <a:spAutoFit/>
+          </a:bodyPr>
+          <a:lstStyle/>
+          <a:p>
+            <a:pPr algn="ctr"/>
+            <a:r>
+              <a:rPr lang="en-US" sz="1400" dirty="0">
+                <a:sym typeface="+mn-ea"/>
+              </a:rPr>
+              <a:t>DEK KeyBlob</a:t>
+            </a:r>
+            <a:endParaRPr lang="en-US" sz="1400" dirty="0"/>
+          </a:p>
+        </p:txBody>
+      </p:sp>
+      <p:sp>
+        <p:nvSpPr>
+          <p:cNvPr id="30" name="TextBox 63"/>
+          <p:cNvSpPr txBox="1"/>
+          <p:nvPr/>
+        </p:nvSpPr>
+        <p:spPr>
+          <a:xfrm>
+            <a:off x="7955161" y="2410377"/>
+            <a:ext cx="2870835" cy="276999"/>
+          </a:xfrm>
+          <a:prstGeom prst="rect">
+            <a:avLst/>
+          </a:prstGeom>
+          <a:solidFill>
+            <a:schemeClr val="accent3"/>
+          </a:solidFill>
+          <a:ln w="19050">
+            <a:solidFill>
+              <a:schemeClr val="tx1"/>
+            </a:solidFill>
+          </a:ln>
+        </p:spPr>
+        <p:txBody>
+          <a:bodyPr wrap="square" rtlCol="0">
+            <a:spAutoFit/>
+          </a:bodyPr>
+          <a:lstStyle/>
+          <a:p>
+            <a:pPr algn="ctr"/>
+            <a:r>
+              <a:rPr lang="en-US" sz="1200" dirty="0">
+                <a:sym typeface="+mn-ea"/>
+              </a:rPr>
+              <a:t>Device Configuration Data (DCD)</a:t>
+            </a:r>
+            <a:endParaRPr lang="en-US" sz="1200" dirty="0"/>
+          </a:p>
+        </p:txBody>
+      </p:sp>
+      <p:sp>
+        <p:nvSpPr>
+          <p:cNvPr id="35" name="TextBox 63">
+            <a:extLst>
+              <a:ext uri="{FF2B5EF4-FFF2-40B4-BE49-F238E27FC236}">
+                <a16:creationId xmlns:a16="http://schemas.microsoft.com/office/drawing/2014/main" id="{EBC1FD4F-DC10-45A6-8954-943A5205A0BE}"/>
+              </a:ext>
+            </a:extLst>
+          </p:cNvPr>
+          <p:cNvSpPr txBox="1"/>
+          <p:nvPr/>
+        </p:nvSpPr>
+        <p:spPr>
+          <a:xfrm>
+            <a:off x="7948811" y="559474"/>
+            <a:ext cx="2870835" cy="523220"/>
+          </a:xfrm>
+          <a:prstGeom prst="rect">
+            <a:avLst/>
+          </a:prstGeom>
+          <a:solidFill>
+            <a:srgbClr val="C19F32"/>
+          </a:solidFill>
+          <a:ln w="19050">
+            <a:solidFill>
+              <a:schemeClr val="tx1"/>
+            </a:solidFill>
+          </a:ln>
+        </p:spPr>
+        <p:txBody>
+          <a:bodyPr wrap="square" rtlCol="0">
+            <a:spAutoFit/>
+          </a:bodyPr>
+          <a:lstStyle/>
+          <a:p>
+            <a:pPr algn="ctr"/>
+            <a:r>
+              <a:rPr lang="en-US" altLang="zh-CN" sz="1400" dirty="0"/>
+              <a:t>Main Boot Record (MBR)</a:t>
+            </a:r>
+            <a:endParaRPr lang="en-US" sz="1400" dirty="0">
+              <a:sym typeface="+mn-ea"/>
+            </a:endParaRPr>
+          </a:p>
+          <a:p>
+            <a:pPr algn="ctr"/>
+            <a:r>
+              <a:rPr lang="en-US" altLang="zh-CN" sz="1400" dirty="0"/>
+              <a:t>Disk Partition Table (DPT)</a:t>
+            </a:r>
+            <a:endParaRPr lang="en-US" sz="1400" dirty="0"/>
           </a:p>
         </p:txBody>
       </p:sp>

</xml_diff>